<commit_message>
Add Presentations for the Week
</commit_message>
<xml_diff>
--- a/Documents/Meeting Updates/MarchingMasters-1013.pptx
+++ b/Documents/Meeting Updates/MarchingMasters-1013.pptx
@@ -3642,14 +3642,20 @@
               </a:spcBef>
             </a:pPr>
             <a:r>
-              <a:rPr lang="en-US" dirty="0">
+              <a:rPr lang="en-US">
                 <a:solidFill>
                   <a:schemeClr val="accent2"/>
                 </a:solidFill>
                 <a:latin typeface="Verdana Pro" panose="020B0604030504040204" pitchFamily="34" charset="0"/>
               </a:rPr>
-              <a:t>10/06/2020</a:t>
-            </a:r>
+              <a:t>10/13/2020</a:t>
+            </a:r>
+            <a:endParaRPr lang="en-US" dirty="0">
+              <a:solidFill>
+                <a:schemeClr val="accent2"/>
+              </a:solidFill>
+              <a:latin typeface="Verdana Pro" panose="020B0604030504040204" pitchFamily="34" charset="0"/>
+            </a:endParaRPr>
           </a:p>
         </p:txBody>
       </p:sp>

</xml_diff>

<commit_message>
Uodate to presentation and schedule
</commit_message>
<xml_diff>
--- a/Documents/Meeting Updates/MarchingMasters-1013.pptx
+++ b/Documents/Meeting Updates/MarchingMasters-1013.pptx
@@ -4401,20 +4401,28 @@
         </p:spPr>
         <p:txBody>
           <a:bodyPr>
-            <a:normAutofit lnSpcReduction="10000"/>
+            <a:normAutofit/>
           </a:bodyPr>
           <a:lstStyle/>
           <a:p>
             <a:r>
               <a:rPr lang="en-US" dirty="0"/>
-              <a:t>Project Schedule (Aparna, Siddharth)</a:t>
+              <a:t>Project Schedule (</a:t>
+            </a:r>
+            <a:r>
+              <a:rPr lang="en-US" dirty="0" err="1"/>
+              <a:t>Aparna,Tumaris</a:t>
+            </a:r>
+            <a:r>
+              <a:rPr lang="en-US" dirty="0"/>
+              <a:t>)</a:t>
             </a:r>
           </a:p>
           <a:p>
             <a:pPr lvl="1"/>
             <a:r>
               <a:rPr lang="en-US" sz="2000" dirty="0"/>
-              <a:t>Develop project schedule to be used for accomplishing project tasks.</a:t>
+              <a:t>Develop project schedule (baselined) to be used for accomplishing project tasks.</a:t>
             </a:r>
           </a:p>
           <a:p>
@@ -4439,37 +4447,30 @@
               <a:rPr lang="en-US" dirty="0" err="1">
                 <a:sym typeface="Wingdings" pitchFamily="2" charset="2"/>
               </a:rPr>
-              <a:t>Jeffer</a:t>
+              <a:t>Brandin,Jeffer</a:t>
             </a:r>
             <a:r>
               <a:rPr lang="en-US" dirty="0">
                 <a:sym typeface="Wingdings" pitchFamily="2" charset="2"/>
               </a:rPr>
-              <a:t>, Brandin)</a:t>
+              <a:t>)</a:t>
             </a:r>
           </a:p>
           <a:p>
             <a:pPr lvl="1"/>
             <a:r>
               <a:rPr lang="en-US" sz="2000" dirty="0"/>
-              <a:t>Identify users of the system and Conduct interviews to determine user roles and needs. </a:t>
-            </a:r>
-          </a:p>
-          <a:p>
-            <a:pPr lvl="1"/>
-            <a:r>
-              <a:rPr lang="en-US" sz="2000" dirty="0"/>
-              <a:t>Goal: Identify at least 5 users and have interviews scheduled.</a:t>
+              <a:t>Goal: Conduct Interviews with potential users and continue work on document.</a:t>
             </a:r>
           </a:p>
           <a:p>
             <a:r>
               <a:rPr lang="en-US" dirty="0"/>
-              <a:t>Market Research (Adam, </a:t>
+              <a:t>Proof of Concept (</a:t>
             </a:r>
             <a:r>
               <a:rPr lang="en-US" dirty="0" err="1"/>
-              <a:t>Tumaris</a:t>
+              <a:t>Siddharth,Adam</a:t>
             </a:r>
             <a:r>
               <a:rPr lang="en-US" dirty="0"/>
@@ -4480,34 +4481,22 @@
             <a:pPr lvl="1"/>
             <a:r>
               <a:rPr lang="en-US" sz="2000" dirty="0"/>
-              <a:t>Obtain market research statistics regarding potential customers within the market.</a:t>
+              <a:t>Prepare a plan on how to approach proving the </a:t>
+            </a:r>
+            <a:r>
+              <a:rPr lang="en-US" sz="2000" dirty="0" err="1"/>
+              <a:t>concept,based</a:t>
+            </a:r>
+            <a:r>
+              <a:rPr lang="en-US" sz="2000" dirty="0"/>
+              <a:t> on proposed technologies, tasks, etc. </a:t>
             </a:r>
           </a:p>
           <a:p>
             <a:pPr lvl="1"/>
             <a:r>
               <a:rPr lang="en-US" sz="2000" dirty="0"/>
-              <a:t>Goal: Compose document or slide deck to present findings.</a:t>
-            </a:r>
-          </a:p>
-          <a:p>
-            <a:r>
-              <a:rPr lang="en-US" dirty="0"/>
-              <a:t>Proof of Concept (Aparna, Brandin)</a:t>
-            </a:r>
-          </a:p>
-          <a:p>
-            <a:pPr lvl="1"/>
-            <a:r>
-              <a:rPr lang="en-US" sz="2000" dirty="0"/>
-              <a:t>Prepare a plan on how to approach proving the concept, including proposed technologies, tasks, etc. </a:t>
-            </a:r>
-          </a:p>
-          <a:p>
-            <a:pPr lvl="1"/>
-            <a:r>
-              <a:rPr lang="en-US" sz="2000" dirty="0"/>
-              <a:t>Goal: Research possible technologies to use. Have list of proposals for group.</a:t>
+              <a:t>Goal: Prepare plan/design of P.O.C.</a:t>
             </a:r>
           </a:p>
         </p:txBody>

</xml_diff>

<commit_message>
Update Meeting Slides 10/13
</commit_message>
<xml_diff>
--- a/Documents/Meeting Updates/MarchingMasters-1013.pptx
+++ b/Documents/Meeting Updates/MarchingMasters-1013.pptx
@@ -338,7 +338,7 @@
           <a:p>
             <a:fld id="{76A6DF96-24C9-6049-963C-8A018557765F}" type="datetimeFigureOut">
               <a:rPr lang="en-US" smtClean="0"/>
-              <a:t>10/11/20</a:t>
+              <a:t>10/13/20</a:t>
             </a:fld>
             <a:endParaRPr lang="en-US"/>
           </a:p>
@@ -536,7 +536,7 @@
           <a:p>
             <a:fld id="{76A6DF96-24C9-6049-963C-8A018557765F}" type="datetimeFigureOut">
               <a:rPr lang="en-US" smtClean="0"/>
-              <a:t>10/11/20</a:t>
+              <a:t>10/13/20</a:t>
             </a:fld>
             <a:endParaRPr lang="en-US"/>
           </a:p>
@@ -744,7 +744,7 @@
           <a:p>
             <a:fld id="{76A6DF96-24C9-6049-963C-8A018557765F}" type="datetimeFigureOut">
               <a:rPr lang="en-US" smtClean="0"/>
-              <a:t>10/11/20</a:t>
+              <a:t>10/13/20</a:t>
             </a:fld>
             <a:endParaRPr lang="en-US"/>
           </a:p>
@@ -942,7 +942,7 @@
           <a:p>
             <a:fld id="{76A6DF96-24C9-6049-963C-8A018557765F}" type="datetimeFigureOut">
               <a:rPr lang="en-US" smtClean="0"/>
-              <a:t>10/11/20</a:t>
+              <a:t>10/13/20</a:t>
             </a:fld>
             <a:endParaRPr lang="en-US"/>
           </a:p>
@@ -1217,7 +1217,7 @@
           <a:p>
             <a:fld id="{76A6DF96-24C9-6049-963C-8A018557765F}" type="datetimeFigureOut">
               <a:rPr lang="en-US" smtClean="0"/>
-              <a:t>10/11/20</a:t>
+              <a:t>10/13/20</a:t>
             </a:fld>
             <a:endParaRPr lang="en-US"/>
           </a:p>
@@ -1482,7 +1482,7 @@
           <a:p>
             <a:fld id="{76A6DF96-24C9-6049-963C-8A018557765F}" type="datetimeFigureOut">
               <a:rPr lang="en-US" smtClean="0"/>
-              <a:t>10/11/20</a:t>
+              <a:t>10/13/20</a:t>
             </a:fld>
             <a:endParaRPr lang="en-US"/>
           </a:p>
@@ -1894,7 +1894,7 @@
           <a:p>
             <a:fld id="{76A6DF96-24C9-6049-963C-8A018557765F}" type="datetimeFigureOut">
               <a:rPr lang="en-US" smtClean="0"/>
-              <a:t>10/11/20</a:t>
+              <a:t>10/13/20</a:t>
             </a:fld>
             <a:endParaRPr lang="en-US"/>
           </a:p>
@@ -2035,7 +2035,7 @@
           <a:p>
             <a:fld id="{76A6DF96-24C9-6049-963C-8A018557765F}" type="datetimeFigureOut">
               <a:rPr lang="en-US" smtClean="0"/>
-              <a:t>10/11/20</a:t>
+              <a:t>10/13/20</a:t>
             </a:fld>
             <a:endParaRPr lang="en-US"/>
           </a:p>
@@ -2148,7 +2148,7 @@
           <a:p>
             <a:fld id="{76A6DF96-24C9-6049-963C-8A018557765F}" type="datetimeFigureOut">
               <a:rPr lang="en-US" smtClean="0"/>
-              <a:t>10/11/20</a:t>
+              <a:t>10/13/20</a:t>
             </a:fld>
             <a:endParaRPr lang="en-US"/>
           </a:p>
@@ -2459,7 +2459,7 @@
           <a:p>
             <a:fld id="{76A6DF96-24C9-6049-963C-8A018557765F}" type="datetimeFigureOut">
               <a:rPr lang="en-US" smtClean="0"/>
-              <a:t>10/11/20</a:t>
+              <a:t>10/13/20</a:t>
             </a:fld>
             <a:endParaRPr lang="en-US"/>
           </a:p>
@@ -2747,7 +2747,7 @@
           <a:p>
             <a:fld id="{76A6DF96-24C9-6049-963C-8A018557765F}" type="datetimeFigureOut">
               <a:rPr lang="en-US" smtClean="0"/>
-              <a:t>10/11/20</a:t>
+              <a:t>10/13/20</a:t>
             </a:fld>
             <a:endParaRPr lang="en-US"/>
           </a:p>
@@ -2988,7 +2988,7 @@
           <a:p>
             <a:fld id="{76A6DF96-24C9-6049-963C-8A018557765F}" type="datetimeFigureOut">
               <a:rPr lang="en-US" smtClean="0"/>
-              <a:t>10/11/20</a:t>
+              <a:t>10/13/20</a:t>
             </a:fld>
             <a:endParaRPr lang="en-US"/>
           </a:p>
@@ -3916,14 +3916,22 @@
             <a:pPr lvl="1"/>
             <a:r>
               <a:rPr lang="en-US" sz="2000" dirty="0"/>
-              <a:t>Obtain market research statistics regarding potential customers within the market.</a:t>
+              <a:t>Obtained market research statistics regarding potential customers within the market.</a:t>
             </a:r>
           </a:p>
           <a:p>
             <a:pPr lvl="1"/>
             <a:r>
               <a:rPr lang="en-US" sz="2000" dirty="0"/>
-              <a:t>Goal: Compose document or slide deck to present findings.</a:t>
+              <a:t>Composed </a:t>
+            </a:r>
+            <a:r>
+              <a:rPr lang="en-US" sz="2000"/>
+              <a:t>document presenting </a:t>
+            </a:r>
+            <a:r>
+              <a:rPr lang="en-US" sz="2000" dirty="0"/>
+              <a:t>findings.</a:t>
             </a:r>
           </a:p>
           <a:p>

</xml_diff>